<commit_message>
edit chapter 01 and 05
</commit_message>
<xml_diff>
--- a/Lecture/C05 Accessibility_Internationalization.pptx
+++ b/Lecture/C05 Accessibility_Internationalization.pptx
@@ -5,7 +5,7 @@
     <p:sldMasterId id="2147483659" r:id="rId1"/>
   </p:sldMasterIdLst>
   <p:notesMasterIdLst>
-    <p:notesMasterId r:id="rId18"/>
+    <p:notesMasterId r:id="rId26"/>
   </p:notesMasterIdLst>
   <p:sldIdLst>
     <p:sldId id="256" r:id="rId2"/>
@@ -16,24 +16,32 @@
     <p:sldId id="401" r:id="rId7"/>
     <p:sldId id="402" r:id="rId8"/>
     <p:sldId id="403" r:id="rId9"/>
-    <p:sldId id="379" r:id="rId10"/>
-    <p:sldId id="398" r:id="rId11"/>
-    <p:sldId id="370" r:id="rId12"/>
-    <p:sldId id="380" r:id="rId13"/>
-    <p:sldId id="399" r:id="rId14"/>
-    <p:sldId id="382" r:id="rId15"/>
-    <p:sldId id="404" r:id="rId16"/>
-    <p:sldId id="298" r:id="rId17"/>
+    <p:sldId id="405" r:id="rId10"/>
+    <p:sldId id="379" r:id="rId11"/>
+    <p:sldId id="398" r:id="rId12"/>
+    <p:sldId id="370" r:id="rId13"/>
+    <p:sldId id="380" r:id="rId14"/>
+    <p:sldId id="399" r:id="rId15"/>
+    <p:sldId id="406" r:id="rId16"/>
+    <p:sldId id="407" r:id="rId17"/>
+    <p:sldId id="408" r:id="rId18"/>
+    <p:sldId id="409" r:id="rId19"/>
+    <p:sldId id="410" r:id="rId20"/>
+    <p:sldId id="411" r:id="rId21"/>
+    <p:sldId id="412" r:id="rId22"/>
+    <p:sldId id="382" r:id="rId23"/>
+    <p:sldId id="413" r:id="rId24"/>
+    <p:sldId id="298" r:id="rId25"/>
   </p:sldIdLst>
   <p:sldSz cx="9144000" cy="5143500" type="screen16x9"/>
   <p:notesSz cx="6858000" cy="9144000"/>
   <p:embeddedFontLst>
     <p:embeddedFont>
       <p:font typeface="Roboto" panose="02000000000000000000" pitchFamily="2" charset="0"/>
-      <p:regular r:id="rId19"/>
-      <p:bold r:id="rId20"/>
-      <p:italic r:id="rId21"/>
-      <p:boldItalic r:id="rId22"/>
+      <p:regular r:id="rId27"/>
+      <p:bold r:id="rId28"/>
+      <p:italic r:id="rId29"/>
+      <p:boldItalic r:id="rId30"/>
     </p:embeddedFont>
   </p:embeddedFontLst>
   <p:defaultTextStyle>
@@ -835,6 +843,151 @@
   <p:cSld>
     <p:spTree>
       <p:nvGrpSpPr>
+        <p:cNvPr id="1" name="Shape 226"/>
+        <p:cNvGrpSpPr/>
+        <p:nvPr/>
+      </p:nvGrpSpPr>
+      <p:grpSpPr>
+        <a:xfrm>
+          <a:off x="0" y="0"/>
+          <a:ext cx="0" cy="0"/>
+          <a:chOff x="0" y="0"/>
+          <a:chExt cx="0" cy="0"/>
+        </a:xfrm>
+      </p:grpSpPr>
+      <p:sp>
+        <p:nvSpPr>
+          <p:cNvPr id="227" name="Google Shape;227;g2388ebc691_2_174:notes"/>
+          <p:cNvSpPr>
+            <a:spLocks noGrp="1" noRot="1" noChangeAspect="1"/>
+          </p:cNvSpPr>
+          <p:nvPr>
+            <p:ph type="sldImg" idx="2"/>
+          </p:nvPr>
+        </p:nvSpPr>
+        <p:spPr>
+          <a:xfrm>
+            <a:off x="381000" y="685800"/>
+            <a:ext cx="6096000" cy="3429000"/>
+          </a:xfrm>
+          <a:custGeom>
+            <a:avLst/>
+            <a:gdLst/>
+            <a:ahLst/>
+            <a:cxnLst/>
+            <a:rect l="l" t="t" r="r" b="b"/>
+            <a:pathLst>
+              <a:path w="120000" h="120000" extrusionOk="0">
+                <a:moveTo>
+                  <a:pt x="0" y="0"/>
+                </a:moveTo>
+                <a:lnTo>
+                  <a:pt x="120000" y="0"/>
+                </a:lnTo>
+                <a:lnTo>
+                  <a:pt x="120000" y="120000"/>
+                </a:lnTo>
+                <a:lnTo>
+                  <a:pt x="0" y="120000"/>
+                </a:lnTo>
+                <a:close/>
+              </a:path>
+            </a:pathLst>
+          </a:custGeom>
+        </p:spPr>
+      </p:sp>
+      <p:sp>
+        <p:nvSpPr>
+          <p:cNvPr id="228" name="Google Shape;228;g2388ebc691_2_174:notes"/>
+          <p:cNvSpPr txBox="1">
+            <a:spLocks noGrp="1"/>
+          </p:cNvSpPr>
+          <p:nvPr>
+            <p:ph type="body" idx="1"/>
+          </p:nvPr>
+        </p:nvSpPr>
+        <p:spPr>
+          <a:xfrm>
+            <a:off x="685800" y="4343400"/>
+            <a:ext cx="5486400" cy="4114800"/>
+          </a:xfrm>
+          <a:prstGeom prst="rect">
+            <a:avLst/>
+          </a:prstGeom>
+        </p:spPr>
+        <p:txBody>
+          <a:bodyPr spcFirstLastPara="1" wrap="square" lIns="91425" tIns="91425" rIns="91425" bIns="91425" anchor="t" anchorCtr="0">
+            <a:noAutofit/>
+          </a:bodyPr>
+          <a:lstStyle/>
+          <a:p>
+            <a:pPr marL="0" lvl="0" indent="0" algn="l" rtl="0">
+              <a:spcBef>
+                <a:spcPts val="0"/>
+              </a:spcBef>
+              <a:spcAft>
+                <a:spcPts val="0"/>
+              </a:spcAft>
+              <a:buNone/>
+            </a:pPr>
+            <a:r>
+              <a:rPr lang="en-GB"/>
+              <a:t>StatelessWidget is used for immutable elements that only rely on the object configuration information</a:t>
+            </a:r>
+            <a:endParaRPr/>
+          </a:p>
+          <a:p>
+            <a:pPr marL="0" lvl="0" indent="0" algn="l" rtl="0">
+              <a:spcBef>
+                <a:spcPts val="0"/>
+              </a:spcBef>
+              <a:spcAft>
+                <a:spcPts val="0"/>
+              </a:spcAft>
+              <a:buNone/>
+            </a:pPr>
+            <a:r>
+              <a:rPr lang="en-GB"/>
+              <a:t>StatefulWidget is used for elements that can dynamically change based on state-changes in the system</a:t>
+            </a:r>
+            <a:endParaRPr/>
+          </a:p>
+          <a:p>
+            <a:pPr marL="0" lvl="0" indent="0" algn="l" rtl="0">
+              <a:spcBef>
+                <a:spcPts val="0"/>
+              </a:spcBef>
+              <a:spcAft>
+                <a:spcPts val="0"/>
+              </a:spcAft>
+              <a:buNone/>
+            </a:pPr>
+            <a:r>
+              <a:rPr lang="en-GB"/>
+              <a:t>Everytime that state changes, setChange() is called by the object</a:t>
+            </a:r>
+            <a:endParaRPr/>
+          </a:p>
+        </p:txBody>
+      </p:sp>
+    </p:spTree>
+    <p:extLst>
+      <p:ext uri="{BB962C8B-B14F-4D97-AF65-F5344CB8AC3E}">
+        <p14:creationId xmlns:p14="http://schemas.microsoft.com/office/powerpoint/2010/main" val="1263857615"/>
+      </p:ext>
+    </p:extLst>
+  </p:cSld>
+  <p:clrMapOvr>
+    <a:masterClrMapping/>
+  </p:clrMapOvr>
+</p:notes>
+</file>
+
+<file path=ppt/notesSlides/notesSlide11.xml><?xml version="1.0" encoding="utf-8"?>
+<p:notes xmlns:a="http://schemas.openxmlformats.org/drawingml/2006/main" xmlns:r="http://schemas.openxmlformats.org/officeDocument/2006/relationships" xmlns:p="http://schemas.openxmlformats.org/presentationml/2006/main" showMasterSp="0" showMasterPhAnim="0">
+  <p:cSld>
+    <p:spTree>
+      <p:nvGrpSpPr>
         <p:cNvPr id="1" name="Shape 392"/>
         <p:cNvGrpSpPr/>
         <p:nvPr/>
@@ -1733,7 +1886,7 @@
   <p:cSld>
     <p:spTree>
       <p:nvGrpSpPr>
-        <p:cNvPr id="1" name="Shape 226"/>
+        <p:cNvPr id="1" name="Shape 88"/>
         <p:cNvGrpSpPr/>
         <p:nvPr/>
       </p:nvGrpSpPr>
@@ -1747,7 +1900,7 @@
       </p:grpSpPr>
       <p:sp>
         <p:nvSpPr>
-          <p:cNvPr id="227" name="Google Shape;227;g2388ebc691_2_174:notes"/>
+          <p:cNvPr id="89" name="Google Shape;89;g2480e1310f_0_10:notes"/>
           <p:cNvSpPr>
             <a:spLocks noGrp="1" noRot="1" noChangeAspect="1"/>
           </p:cNvSpPr>
@@ -1788,7 +1941,7 @@
       </p:sp>
       <p:sp>
         <p:nvSpPr>
-          <p:cNvPr id="228" name="Google Shape;228;g2388ebc691_2_174:notes"/>
+          <p:cNvPr id="90" name="Google Shape;90;g2480e1310f_0_10:notes"/>
           <p:cNvSpPr txBox="1">
             <a:spLocks noGrp="1"/>
           </p:cNvSpPr>
@@ -1820,42 +1973,6 @@
               </a:spcAft>
               <a:buNone/>
             </a:pPr>
-            <a:r>
-              <a:rPr lang="en-GB"/>
-              <a:t>StatelessWidget is used for immutable elements that only rely on the object configuration information</a:t>
-            </a:r>
-            <a:endParaRPr/>
-          </a:p>
-          <a:p>
-            <a:pPr marL="0" lvl="0" indent="0" algn="l" rtl="0">
-              <a:spcBef>
-                <a:spcPts val="0"/>
-              </a:spcBef>
-              <a:spcAft>
-                <a:spcPts val="0"/>
-              </a:spcAft>
-              <a:buNone/>
-            </a:pPr>
-            <a:r>
-              <a:rPr lang="en-GB"/>
-              <a:t>StatefulWidget is used for elements that can dynamically change based on state-changes in the system</a:t>
-            </a:r>
-            <a:endParaRPr/>
-          </a:p>
-          <a:p>
-            <a:pPr marL="0" lvl="0" indent="0" algn="l" rtl="0">
-              <a:spcBef>
-                <a:spcPts val="0"/>
-              </a:spcBef>
-              <a:spcAft>
-                <a:spcPts val="0"/>
-              </a:spcAft>
-              <a:buNone/>
-            </a:pPr>
-            <a:r>
-              <a:rPr lang="en-GB"/>
-              <a:t>Everytime that state changes, setChange() is called by the object</a:t>
-            </a:r>
             <a:endParaRPr/>
           </a:p>
         </p:txBody>
@@ -1863,7 +1980,7 @@
     </p:spTree>
     <p:extLst>
       <p:ext uri="{BB962C8B-B14F-4D97-AF65-F5344CB8AC3E}">
-        <p14:creationId xmlns:p14="http://schemas.microsoft.com/office/powerpoint/2010/main" val="1263857615"/>
+        <p14:creationId xmlns:p14="http://schemas.microsoft.com/office/powerpoint/2010/main" val="1841812687"/>
       </p:ext>
     </p:extLst>
   </p:cSld>
@@ -6202,6 +6319,151 @@
           <a:p>
             <a:r>
               <a:rPr lang="en" altLang="zh-CN" b="1" dirty="0"/>
+              <a:t>Active interactions</a:t>
+            </a:r>
+            <a:r>
+              <a:rPr lang="en" altLang="zh-CN" dirty="0"/>
+              <a:t>. Ensure that all active interactions do something.</a:t>
+            </a:r>
+          </a:p>
+          <a:p>
+            <a:r>
+              <a:rPr lang="en" altLang="zh-CN" b="1" dirty="0"/>
+              <a:t>Screen reader testing</a:t>
+            </a:r>
+            <a:r>
+              <a:rPr lang="en" altLang="zh-CN" dirty="0"/>
+              <a:t>. Test your app with </a:t>
+            </a:r>
+            <a:r>
+              <a:rPr lang="en" altLang="zh-CN" dirty="0">
+                <a:hlinkClick r:id="rId2"/>
+              </a:rPr>
+              <a:t>TalkBack</a:t>
+            </a:r>
+            <a:r>
+              <a:rPr lang="en" altLang="zh-CN" dirty="0"/>
+              <a:t> (Android) and </a:t>
+            </a:r>
+            <a:r>
+              <a:rPr lang="en" altLang="zh-CN" dirty="0">
+                <a:hlinkClick r:id="rId3"/>
+              </a:rPr>
+              <a:t>VoiceOver</a:t>
+            </a:r>
+            <a:r>
+              <a:rPr lang="en" altLang="zh-CN" dirty="0"/>
+              <a:t> (iOS).</a:t>
+            </a:r>
+          </a:p>
+          <a:p>
+            <a:r>
+              <a:rPr lang="en" altLang="zh-CN" b="1" dirty="0"/>
+              <a:t>Contrast ratios</a:t>
+            </a:r>
+            <a:r>
+              <a:rPr lang="en" altLang="zh-CN" dirty="0"/>
+              <a:t>. We encourage you to have a contrast ratio of at least 4.5:1 between controls or text and the background, with the exception of disabled components.</a:t>
+            </a:r>
+          </a:p>
+          <a:p>
+            <a:r>
+              <a:rPr lang="en" altLang="zh-CN" b="1" dirty="0"/>
+              <a:t>Context switching</a:t>
+            </a:r>
+            <a:r>
+              <a:rPr lang="en" altLang="zh-CN" dirty="0"/>
+              <a:t>. Nothing should change the user’s context automatically while typing in information</a:t>
+            </a:r>
+            <a:r>
+              <a:rPr lang="en-US" altLang="zh-CN" dirty="0"/>
+              <a:t>.</a:t>
+            </a:r>
+            <a:endParaRPr lang="en" altLang="zh-CN" dirty="0"/>
+          </a:p>
+        </p:txBody>
+      </p:sp>
+    </p:spTree>
+    <p:extLst>
+      <p:ext uri="{BB962C8B-B14F-4D97-AF65-F5344CB8AC3E}">
+        <p14:creationId xmlns:p14="http://schemas.microsoft.com/office/powerpoint/2010/main" val="799262490"/>
+      </p:ext>
+    </p:extLst>
+  </p:cSld>
+  <p:clrMapOvr>
+    <a:masterClrMapping/>
+  </p:clrMapOvr>
+</p:sld>
+</file>
+
+<file path=ppt/slides/slide11.xml><?xml version="1.0" encoding="utf-8"?>
+<p:sld xmlns:a="http://schemas.openxmlformats.org/drawingml/2006/main" xmlns:r="http://schemas.openxmlformats.org/officeDocument/2006/relationships" xmlns:p="http://schemas.openxmlformats.org/presentationml/2006/main">
+  <p:cSld>
+    <p:spTree>
+      <p:nvGrpSpPr>
+        <p:cNvPr id="1" name=""/>
+        <p:cNvGrpSpPr/>
+        <p:nvPr/>
+      </p:nvGrpSpPr>
+      <p:grpSpPr>
+        <a:xfrm>
+          <a:off x="0" y="0"/>
+          <a:ext cx="0" cy="0"/>
+          <a:chOff x="0" y="0"/>
+          <a:chExt cx="0" cy="0"/>
+        </a:xfrm>
+      </p:grpSpPr>
+      <p:sp>
+        <p:nvSpPr>
+          <p:cNvPr id="2" name="标题 1">
+            <a:extLst>
+              <a:ext uri="{FF2B5EF4-FFF2-40B4-BE49-F238E27FC236}">
+                <a16:creationId xmlns:a16="http://schemas.microsoft.com/office/drawing/2014/main" id="{8C11FDA8-AF18-FA43-9504-DFDBB3A97747}"/>
+              </a:ext>
+            </a:extLst>
+          </p:cNvPr>
+          <p:cNvSpPr>
+            <a:spLocks noGrp="1"/>
+          </p:cNvSpPr>
+          <p:nvPr>
+            <p:ph type="title"/>
+          </p:nvPr>
+        </p:nvSpPr>
+        <p:spPr/>
+        <p:txBody>
+          <a:bodyPr/>
+          <a:lstStyle/>
+          <a:p>
+            <a:r>
+              <a:rPr lang="en" altLang="zh-CN" dirty="0"/>
+              <a:t>Accessibility release checklist</a:t>
+            </a:r>
+          </a:p>
+        </p:txBody>
+      </p:sp>
+      <p:sp>
+        <p:nvSpPr>
+          <p:cNvPr id="3" name="文本占位符 2">
+            <a:extLst>
+              <a:ext uri="{FF2B5EF4-FFF2-40B4-BE49-F238E27FC236}">
+                <a16:creationId xmlns:a16="http://schemas.microsoft.com/office/drawing/2014/main" id="{3135C567-0A5A-FA4A-908F-05ACAD91C297}"/>
+              </a:ext>
+            </a:extLst>
+          </p:cNvPr>
+          <p:cNvSpPr>
+            <a:spLocks noGrp="1"/>
+          </p:cNvSpPr>
+          <p:nvPr>
+            <p:ph type="body" idx="1"/>
+          </p:nvPr>
+        </p:nvSpPr>
+        <p:spPr/>
+        <p:txBody>
+          <a:bodyPr/>
+          <a:lstStyle/>
+          <a:p>
+            <a:r>
+              <a:rPr lang="en" altLang="zh-CN" b="1" dirty="0"/>
               <a:t>Tappable targets</a:t>
             </a:r>
             <a:r>
@@ -6254,7 +6516,7 @@
 </p:sld>
 </file>
 
-<file path=ppt/slides/slide11.xml><?xml version="1.0" encoding="utf-8"?>
+<file path=ppt/slides/slide12.xml><?xml version="1.0" encoding="utf-8"?>
 <p:sld xmlns:a="http://schemas.openxmlformats.org/drawingml/2006/main" xmlns:r="http://schemas.openxmlformats.org/officeDocument/2006/relationships" xmlns:p="http://schemas.openxmlformats.org/presentationml/2006/main">
   <p:cSld>
     <p:spTree>
@@ -6308,105 +6570,6 @@
     <p:extLst>
       <p:ext uri="{BB962C8B-B14F-4D97-AF65-F5344CB8AC3E}">
         <p14:creationId xmlns:p14="http://schemas.microsoft.com/office/powerpoint/2010/main" val="3968568231"/>
-      </p:ext>
-    </p:extLst>
-  </p:cSld>
-  <p:clrMapOvr>
-    <a:masterClrMapping/>
-  </p:clrMapOvr>
-</p:sld>
-</file>
-
-<file path=ppt/slides/slide12.xml><?xml version="1.0" encoding="utf-8"?>
-<p:sld xmlns:a="http://schemas.openxmlformats.org/drawingml/2006/main" xmlns:r="http://schemas.openxmlformats.org/officeDocument/2006/relationships" xmlns:p="http://schemas.openxmlformats.org/presentationml/2006/main">
-  <p:cSld>
-    <p:spTree>
-      <p:nvGrpSpPr>
-        <p:cNvPr id="1" name=""/>
-        <p:cNvGrpSpPr/>
-        <p:nvPr/>
-      </p:nvGrpSpPr>
-      <p:grpSpPr>
-        <a:xfrm>
-          <a:off x="0" y="0"/>
-          <a:ext cx="0" cy="0"/>
-          <a:chOff x="0" y="0"/>
-          <a:chExt cx="0" cy="0"/>
-        </a:xfrm>
-      </p:grpSpPr>
-      <p:sp>
-        <p:nvSpPr>
-          <p:cNvPr id="2" name="标题 1">
-            <a:extLst>
-              <a:ext uri="{FF2B5EF4-FFF2-40B4-BE49-F238E27FC236}">
-                <a16:creationId xmlns:a16="http://schemas.microsoft.com/office/drawing/2014/main" id="{8646D9FB-3ACD-384F-A4D2-D56383569BFB}"/>
-              </a:ext>
-            </a:extLst>
-          </p:cNvPr>
-          <p:cNvSpPr>
-            <a:spLocks noGrp="1"/>
-          </p:cNvSpPr>
-          <p:nvPr>
-            <p:ph type="title"/>
-          </p:nvPr>
-        </p:nvSpPr>
-        <p:spPr/>
-        <p:txBody>
-          <a:bodyPr/>
-          <a:lstStyle/>
-          <a:p>
-            <a:r>
-              <a:rPr lang="en" altLang="zh-CN" dirty="0"/>
-              <a:t>What you’ll learn</a:t>
-            </a:r>
-            <a:endParaRPr kumimoji="1" lang="zh-CN" altLang="en-US" dirty="0"/>
-          </a:p>
-        </p:txBody>
-      </p:sp>
-      <p:sp>
-        <p:nvSpPr>
-          <p:cNvPr id="3" name="文本占位符 2">
-            <a:extLst>
-              <a:ext uri="{FF2B5EF4-FFF2-40B4-BE49-F238E27FC236}">
-                <a16:creationId xmlns:a16="http://schemas.microsoft.com/office/drawing/2014/main" id="{58940195-9C28-1940-9836-A93C75DDE7F6}"/>
-              </a:ext>
-            </a:extLst>
-          </p:cNvPr>
-          <p:cNvSpPr>
-            <a:spLocks noGrp="1"/>
-          </p:cNvSpPr>
-          <p:nvPr>
-            <p:ph type="body" idx="1"/>
-          </p:nvPr>
-        </p:nvSpPr>
-        <p:spPr/>
-        <p:txBody>
-          <a:bodyPr/>
-          <a:lstStyle/>
-          <a:p>
-            <a:r>
-              <a:rPr lang="en" altLang="zh-CN" dirty="0"/>
-              <a:t>How to track the device’s locale (the user’s preferred language).</a:t>
-            </a:r>
-          </a:p>
-          <a:p>
-            <a:r>
-              <a:rPr lang="en" altLang="zh-CN" dirty="0"/>
-              <a:t>How to manage locale-specific app values.</a:t>
-            </a:r>
-          </a:p>
-          <a:p>
-            <a:r>
-              <a:rPr lang="en" altLang="zh-CN" dirty="0"/>
-              <a:t>How to define the locales an app supports.</a:t>
-            </a:r>
-          </a:p>
-        </p:txBody>
-      </p:sp>
-    </p:spTree>
-    <p:extLst>
-      <p:ext uri="{BB962C8B-B14F-4D97-AF65-F5344CB8AC3E}">
-        <p14:creationId xmlns:p14="http://schemas.microsoft.com/office/powerpoint/2010/main" val="1655264088"/>
       </p:ext>
     </p:extLst>
   </p:cSld>
@@ -6456,8 +6619,9 @@
           <a:p>
             <a:r>
               <a:rPr lang="en" altLang="zh-CN" dirty="0"/>
-              <a:t>Sample internationalized apps</a:t>
-            </a:r>
+              <a:t>What you’ll learn</a:t>
+            </a:r>
+            <a:endParaRPr kumimoji="1" lang="zh-CN" altLang="en-US" dirty="0"/>
           </a:p>
         </p:txBody>
       </p:sp>
@@ -6484,6 +6648,104 @@
           <a:p>
             <a:r>
               <a:rPr lang="en" altLang="zh-CN" dirty="0"/>
+              <a:t>How to track the device’s locale (the user’s preferred language).</a:t>
+            </a:r>
+          </a:p>
+          <a:p>
+            <a:r>
+              <a:rPr lang="en" altLang="zh-CN" dirty="0"/>
+              <a:t>How to manage locale-specific app values.</a:t>
+            </a:r>
+          </a:p>
+          <a:p>
+            <a:r>
+              <a:rPr lang="en" altLang="zh-CN" dirty="0"/>
+              <a:t>How to define the locales an app supports.</a:t>
+            </a:r>
+          </a:p>
+        </p:txBody>
+      </p:sp>
+    </p:spTree>
+    <p:extLst>
+      <p:ext uri="{BB962C8B-B14F-4D97-AF65-F5344CB8AC3E}">
+        <p14:creationId xmlns:p14="http://schemas.microsoft.com/office/powerpoint/2010/main" val="1655264088"/>
+      </p:ext>
+    </p:extLst>
+  </p:cSld>
+  <p:clrMapOvr>
+    <a:masterClrMapping/>
+  </p:clrMapOvr>
+</p:sld>
+</file>
+
+<file path=ppt/slides/slide14.xml><?xml version="1.0" encoding="utf-8"?>
+<p:sld xmlns:a="http://schemas.openxmlformats.org/drawingml/2006/main" xmlns:r="http://schemas.openxmlformats.org/officeDocument/2006/relationships" xmlns:p="http://schemas.openxmlformats.org/presentationml/2006/main">
+  <p:cSld>
+    <p:spTree>
+      <p:nvGrpSpPr>
+        <p:cNvPr id="1" name=""/>
+        <p:cNvGrpSpPr/>
+        <p:nvPr/>
+      </p:nvGrpSpPr>
+      <p:grpSpPr>
+        <a:xfrm>
+          <a:off x="0" y="0"/>
+          <a:ext cx="0" cy="0"/>
+          <a:chOff x="0" y="0"/>
+          <a:chExt cx="0" cy="0"/>
+        </a:xfrm>
+      </p:grpSpPr>
+      <p:sp>
+        <p:nvSpPr>
+          <p:cNvPr id="2" name="标题 1">
+            <a:extLst>
+              <a:ext uri="{FF2B5EF4-FFF2-40B4-BE49-F238E27FC236}">
+                <a16:creationId xmlns:a16="http://schemas.microsoft.com/office/drawing/2014/main" id="{8646D9FB-3ACD-384F-A4D2-D56383569BFB}"/>
+              </a:ext>
+            </a:extLst>
+          </p:cNvPr>
+          <p:cNvSpPr>
+            <a:spLocks noGrp="1"/>
+          </p:cNvSpPr>
+          <p:nvPr>
+            <p:ph type="title"/>
+          </p:nvPr>
+        </p:nvSpPr>
+        <p:spPr/>
+        <p:txBody>
+          <a:bodyPr/>
+          <a:lstStyle/>
+          <a:p>
+            <a:r>
+              <a:rPr lang="en" altLang="zh-CN" dirty="0"/>
+              <a:t>Sample internationalized apps</a:t>
+            </a:r>
+          </a:p>
+        </p:txBody>
+      </p:sp>
+      <p:sp>
+        <p:nvSpPr>
+          <p:cNvPr id="3" name="文本占位符 2">
+            <a:extLst>
+              <a:ext uri="{FF2B5EF4-FFF2-40B4-BE49-F238E27FC236}">
+                <a16:creationId xmlns:a16="http://schemas.microsoft.com/office/drawing/2014/main" id="{58940195-9C28-1940-9836-A93C75DDE7F6}"/>
+              </a:ext>
+            </a:extLst>
+          </p:cNvPr>
+          <p:cNvSpPr>
+            <a:spLocks noGrp="1"/>
+          </p:cNvSpPr>
+          <p:nvPr>
+            <p:ph type="body" idx="1"/>
+          </p:nvPr>
+        </p:nvSpPr>
+        <p:spPr/>
+        <p:txBody>
+          <a:bodyPr/>
+          <a:lstStyle/>
+          <a:p>
+            <a:r>
+              <a:rPr lang="en" altLang="zh-CN" dirty="0"/>
               <a:t>If you’d like to start out by reading the code for an internationalized Flutter app, here are two small examples. The first one is intended to be as simple as possible, and the second one uses the APIs and tools provided by the </a:t>
             </a:r>
             <a:r>
@@ -6532,7 +6794,1003 @@
 </p:sld>
 </file>
 
-<file path=ppt/slides/slide14.xml><?xml version="1.0" encoding="utf-8"?>
+<file path=ppt/slides/slide15.xml><?xml version="1.0" encoding="utf-8"?>
+<p:sld xmlns:a="http://schemas.openxmlformats.org/drawingml/2006/main" xmlns:r="http://schemas.openxmlformats.org/officeDocument/2006/relationships" xmlns:p="http://schemas.openxmlformats.org/presentationml/2006/main">
+  <p:cSld>
+    <p:spTree>
+      <p:nvGrpSpPr>
+        <p:cNvPr id="1" name=""/>
+        <p:cNvGrpSpPr/>
+        <p:nvPr/>
+      </p:nvGrpSpPr>
+      <p:grpSpPr>
+        <a:xfrm>
+          <a:off x="0" y="0"/>
+          <a:ext cx="0" cy="0"/>
+          <a:chOff x="0" y="0"/>
+          <a:chExt cx="0" cy="0"/>
+        </a:xfrm>
+      </p:grpSpPr>
+      <p:sp>
+        <p:nvSpPr>
+          <p:cNvPr id="2" name="标题 1">
+            <a:extLst>
+              <a:ext uri="{FF2B5EF4-FFF2-40B4-BE49-F238E27FC236}">
+                <a16:creationId xmlns:a16="http://schemas.microsoft.com/office/drawing/2014/main" id="{8646D9FB-3ACD-384F-A4D2-D56383569BFB}"/>
+              </a:ext>
+            </a:extLst>
+          </p:cNvPr>
+          <p:cNvSpPr>
+            <a:spLocks noGrp="1"/>
+          </p:cNvSpPr>
+          <p:nvPr>
+            <p:ph type="title"/>
+          </p:nvPr>
+        </p:nvSpPr>
+        <p:spPr/>
+        <p:txBody>
+          <a:bodyPr/>
+          <a:lstStyle/>
+          <a:p>
+            <a:r>
+              <a:rPr lang="en" altLang="zh-CN" dirty="0"/>
+              <a:t>Setting up an internation­alized app</a:t>
+            </a:r>
+          </a:p>
+        </p:txBody>
+      </p:sp>
+      <p:sp>
+        <p:nvSpPr>
+          <p:cNvPr id="3" name="文本占位符 2">
+            <a:extLst>
+              <a:ext uri="{FF2B5EF4-FFF2-40B4-BE49-F238E27FC236}">
+                <a16:creationId xmlns:a16="http://schemas.microsoft.com/office/drawing/2014/main" id="{58940195-9C28-1940-9836-A93C75DDE7F6}"/>
+              </a:ext>
+            </a:extLst>
+          </p:cNvPr>
+          <p:cNvSpPr>
+            <a:spLocks noGrp="1"/>
+          </p:cNvSpPr>
+          <p:nvPr>
+            <p:ph type="body" idx="1"/>
+          </p:nvPr>
+        </p:nvSpPr>
+        <p:spPr/>
+        <p:txBody>
+          <a:bodyPr/>
+          <a:lstStyle/>
+          <a:p>
+            <a:r>
+              <a:rPr lang="en" altLang="zh-CN" dirty="0"/>
+              <a:t>By default, Flutter only provides US English localizations. </a:t>
+            </a:r>
+          </a:p>
+          <a:p>
+            <a:r>
+              <a:rPr lang="en" altLang="zh-CN" dirty="0"/>
+              <a:t>To add support for other languages, an application must specify additional </a:t>
+            </a:r>
+            <a:r>
+              <a:rPr lang="en" altLang="zh-CN" dirty="0" err="1">
+                <a:solidFill>
+                  <a:srgbClr val="FF0000"/>
+                </a:solidFill>
+              </a:rPr>
+              <a:t>MaterialApp</a:t>
+            </a:r>
+            <a:r>
+              <a:rPr lang="en" altLang="zh-CN" dirty="0"/>
+              <a:t> (or </a:t>
+            </a:r>
+            <a:r>
+              <a:rPr lang="en" altLang="zh-CN" dirty="0" err="1">
+                <a:solidFill>
+                  <a:srgbClr val="FF0000"/>
+                </a:solidFill>
+              </a:rPr>
+              <a:t>CupertinoApp</a:t>
+            </a:r>
+            <a:r>
+              <a:rPr lang="en" altLang="zh-CN" dirty="0"/>
+              <a:t>) properties, and include a package called </a:t>
+            </a:r>
+            <a:r>
+              <a:rPr lang="en" altLang="zh-CN" dirty="0" err="1">
+                <a:solidFill>
+                  <a:srgbClr val="FF0000"/>
+                </a:solidFill>
+              </a:rPr>
+              <a:t>flutter_localizations</a:t>
+            </a:r>
+            <a:r>
+              <a:rPr lang="en" altLang="zh-CN" dirty="0"/>
+              <a:t>. </a:t>
+            </a:r>
+          </a:p>
+          <a:p>
+            <a:r>
+              <a:rPr lang="en" altLang="zh-CN" dirty="0"/>
+              <a:t>As of November 2020, this package supports 78 languages.</a:t>
+            </a:r>
+          </a:p>
+        </p:txBody>
+      </p:sp>
+    </p:spTree>
+    <p:extLst>
+      <p:ext uri="{BB962C8B-B14F-4D97-AF65-F5344CB8AC3E}">
+        <p14:creationId xmlns:p14="http://schemas.microsoft.com/office/powerpoint/2010/main" val="3061501932"/>
+      </p:ext>
+    </p:extLst>
+  </p:cSld>
+  <p:clrMapOvr>
+    <a:masterClrMapping/>
+  </p:clrMapOvr>
+</p:sld>
+</file>
+
+<file path=ppt/slides/slide16.xml><?xml version="1.0" encoding="utf-8"?>
+<p:sld xmlns:a="http://schemas.openxmlformats.org/drawingml/2006/main" xmlns:r="http://schemas.openxmlformats.org/officeDocument/2006/relationships" xmlns:p="http://schemas.openxmlformats.org/presentationml/2006/main">
+  <p:cSld>
+    <p:spTree>
+      <p:nvGrpSpPr>
+        <p:cNvPr id="1" name=""/>
+        <p:cNvGrpSpPr/>
+        <p:nvPr/>
+      </p:nvGrpSpPr>
+      <p:grpSpPr>
+        <a:xfrm>
+          <a:off x="0" y="0"/>
+          <a:ext cx="0" cy="0"/>
+          <a:chOff x="0" y="0"/>
+          <a:chExt cx="0" cy="0"/>
+        </a:xfrm>
+      </p:grpSpPr>
+      <p:sp>
+        <p:nvSpPr>
+          <p:cNvPr id="2" name="标题 1">
+            <a:extLst>
+              <a:ext uri="{FF2B5EF4-FFF2-40B4-BE49-F238E27FC236}">
+                <a16:creationId xmlns:a16="http://schemas.microsoft.com/office/drawing/2014/main" id="{8646D9FB-3ACD-384F-A4D2-D56383569BFB}"/>
+              </a:ext>
+            </a:extLst>
+          </p:cNvPr>
+          <p:cNvSpPr>
+            <a:spLocks noGrp="1"/>
+          </p:cNvSpPr>
+          <p:nvPr>
+            <p:ph type="title"/>
+          </p:nvPr>
+        </p:nvSpPr>
+        <p:spPr/>
+        <p:txBody>
+          <a:bodyPr/>
+          <a:lstStyle/>
+          <a:p>
+            <a:endParaRPr lang="en" altLang="zh-CN" dirty="0"/>
+          </a:p>
+        </p:txBody>
+      </p:sp>
+      <p:sp>
+        <p:nvSpPr>
+          <p:cNvPr id="3" name="文本占位符 2">
+            <a:extLst>
+              <a:ext uri="{FF2B5EF4-FFF2-40B4-BE49-F238E27FC236}">
+                <a16:creationId xmlns:a16="http://schemas.microsoft.com/office/drawing/2014/main" id="{58940195-9C28-1940-9836-A93C75DDE7F6}"/>
+              </a:ext>
+            </a:extLst>
+          </p:cNvPr>
+          <p:cNvSpPr>
+            <a:spLocks noGrp="1"/>
+          </p:cNvSpPr>
+          <p:nvPr>
+            <p:ph type="body" idx="1"/>
+          </p:nvPr>
+        </p:nvSpPr>
+        <p:spPr/>
+        <p:txBody>
+          <a:bodyPr/>
+          <a:lstStyle/>
+          <a:p>
+            <a:r>
+              <a:rPr lang="en" altLang="zh-CN" dirty="0"/>
+              <a:t>To use </a:t>
+            </a:r>
+            <a:r>
+              <a:rPr lang="en" altLang="zh-CN" dirty="0" err="1">
+                <a:solidFill>
+                  <a:srgbClr val="FF0000"/>
+                </a:solidFill>
+              </a:rPr>
+              <a:t>flutter_localizations</a:t>
+            </a:r>
+            <a:r>
+              <a:rPr lang="en" altLang="zh-CN" dirty="0"/>
+              <a:t>, add the package as a dependency to your </a:t>
+            </a:r>
+            <a:r>
+              <a:rPr lang="en" altLang="zh-CN" dirty="0" err="1">
+                <a:solidFill>
+                  <a:srgbClr val="FF0000"/>
+                </a:solidFill>
+              </a:rPr>
+              <a:t>pubspec.yaml</a:t>
+            </a:r>
+            <a:r>
+              <a:rPr lang="en" altLang="zh-CN" dirty="0">
+                <a:solidFill>
+                  <a:srgbClr val="FF0000"/>
+                </a:solidFill>
+              </a:rPr>
+              <a:t> </a:t>
+            </a:r>
+            <a:r>
+              <a:rPr lang="en" altLang="zh-CN" dirty="0"/>
+              <a:t>file:</a:t>
+            </a:r>
+          </a:p>
+          <a:p>
+            <a:endParaRPr lang="en" altLang="zh-CN" dirty="0"/>
+          </a:p>
+        </p:txBody>
+      </p:sp>
+      <p:pic>
+        <p:nvPicPr>
+          <p:cNvPr id="5" name="图片 4">
+            <a:extLst>
+              <a:ext uri="{FF2B5EF4-FFF2-40B4-BE49-F238E27FC236}">
+                <a16:creationId xmlns:a16="http://schemas.microsoft.com/office/drawing/2014/main" id="{0A091829-6F10-5CF5-B71E-EC6C45A18134}"/>
+              </a:ext>
+            </a:extLst>
+          </p:cNvPr>
+          <p:cNvPicPr>
+            <a:picLocks noChangeAspect="1"/>
+          </p:cNvPicPr>
+          <p:nvPr/>
+        </p:nvPicPr>
+        <p:blipFill>
+          <a:blip r:embed="rId2"/>
+          <a:stretch>
+            <a:fillRect/>
+          </a:stretch>
+        </p:blipFill>
+        <p:spPr>
+          <a:xfrm>
+            <a:off x="1531007" y="2207225"/>
+            <a:ext cx="4064000" cy="1384300"/>
+          </a:xfrm>
+          <a:prstGeom prst="rect">
+            <a:avLst/>
+          </a:prstGeom>
+        </p:spPr>
+      </p:pic>
+    </p:spTree>
+    <p:extLst>
+      <p:ext uri="{BB962C8B-B14F-4D97-AF65-F5344CB8AC3E}">
+        <p14:creationId xmlns:p14="http://schemas.microsoft.com/office/powerpoint/2010/main" val="3159299175"/>
+      </p:ext>
+    </p:extLst>
+  </p:cSld>
+  <p:clrMapOvr>
+    <a:masterClrMapping/>
+  </p:clrMapOvr>
+</p:sld>
+</file>
+
+<file path=ppt/slides/slide17.xml><?xml version="1.0" encoding="utf-8"?>
+<p:sld xmlns:a="http://schemas.openxmlformats.org/drawingml/2006/main" xmlns:r="http://schemas.openxmlformats.org/officeDocument/2006/relationships" xmlns:p="http://schemas.openxmlformats.org/presentationml/2006/main">
+  <p:cSld>
+    <p:spTree>
+      <p:nvGrpSpPr>
+        <p:cNvPr id="1" name=""/>
+        <p:cNvGrpSpPr/>
+        <p:nvPr/>
+      </p:nvGrpSpPr>
+      <p:grpSpPr>
+        <a:xfrm>
+          <a:off x="0" y="0"/>
+          <a:ext cx="0" cy="0"/>
+          <a:chOff x="0" y="0"/>
+          <a:chExt cx="0" cy="0"/>
+        </a:xfrm>
+      </p:grpSpPr>
+      <p:sp>
+        <p:nvSpPr>
+          <p:cNvPr id="2" name="标题 1">
+            <a:extLst>
+              <a:ext uri="{FF2B5EF4-FFF2-40B4-BE49-F238E27FC236}">
+                <a16:creationId xmlns:a16="http://schemas.microsoft.com/office/drawing/2014/main" id="{8646D9FB-3ACD-384F-A4D2-D56383569BFB}"/>
+              </a:ext>
+            </a:extLst>
+          </p:cNvPr>
+          <p:cNvSpPr>
+            <a:spLocks noGrp="1"/>
+          </p:cNvSpPr>
+          <p:nvPr>
+            <p:ph type="title"/>
+          </p:nvPr>
+        </p:nvSpPr>
+        <p:spPr/>
+        <p:txBody>
+          <a:bodyPr/>
+          <a:lstStyle/>
+          <a:p>
+            <a:endParaRPr lang="en" altLang="zh-CN" dirty="0"/>
+          </a:p>
+        </p:txBody>
+      </p:sp>
+      <p:sp>
+        <p:nvSpPr>
+          <p:cNvPr id="3" name="文本占位符 2">
+            <a:extLst>
+              <a:ext uri="{FF2B5EF4-FFF2-40B4-BE49-F238E27FC236}">
+                <a16:creationId xmlns:a16="http://schemas.microsoft.com/office/drawing/2014/main" id="{58940195-9C28-1940-9836-A93C75DDE7F6}"/>
+              </a:ext>
+            </a:extLst>
+          </p:cNvPr>
+          <p:cNvSpPr>
+            <a:spLocks noGrp="1"/>
+          </p:cNvSpPr>
+          <p:nvPr>
+            <p:ph type="body" idx="1"/>
+          </p:nvPr>
+        </p:nvSpPr>
+        <p:spPr/>
+        <p:txBody>
+          <a:bodyPr/>
+          <a:lstStyle/>
+          <a:p>
+            <a:r>
+              <a:rPr lang="en" altLang="zh-CN" dirty="0"/>
+              <a:t>Next, run pub get packages, then import the </a:t>
+            </a:r>
+            <a:r>
+              <a:rPr lang="en" altLang="zh-CN" dirty="0" err="1">
+                <a:solidFill>
+                  <a:srgbClr val="FF0000"/>
+                </a:solidFill>
+              </a:rPr>
+              <a:t>flutter_localizations</a:t>
+            </a:r>
+            <a:r>
+              <a:rPr lang="en" altLang="zh-CN" dirty="0">
+                <a:solidFill>
+                  <a:srgbClr val="FF0000"/>
+                </a:solidFill>
+              </a:rPr>
+              <a:t> </a:t>
+            </a:r>
+            <a:r>
+              <a:rPr lang="en" altLang="zh-CN" dirty="0"/>
+              <a:t>:</a:t>
+            </a:r>
+          </a:p>
+        </p:txBody>
+      </p:sp>
+      <p:pic>
+        <p:nvPicPr>
+          <p:cNvPr id="4" name="图片 3">
+            <a:extLst>
+              <a:ext uri="{FF2B5EF4-FFF2-40B4-BE49-F238E27FC236}">
+                <a16:creationId xmlns:a16="http://schemas.microsoft.com/office/drawing/2014/main" id="{D80985E9-58A1-31AC-1A9E-BA79EAD4128C}"/>
+              </a:ext>
+            </a:extLst>
+          </p:cNvPr>
+          <p:cNvPicPr>
+            <a:picLocks noChangeAspect="1"/>
+          </p:cNvPicPr>
+          <p:nvPr/>
+        </p:nvPicPr>
+        <p:blipFill>
+          <a:blip r:embed="rId2"/>
+          <a:stretch>
+            <a:fillRect/>
+          </a:stretch>
+        </p:blipFill>
+        <p:spPr>
+          <a:xfrm>
+            <a:off x="1216133" y="1729151"/>
+            <a:ext cx="5444797" cy="3051799"/>
+          </a:xfrm>
+          <a:prstGeom prst="rect">
+            <a:avLst/>
+          </a:prstGeom>
+        </p:spPr>
+      </p:pic>
+    </p:spTree>
+    <p:extLst>
+      <p:ext uri="{BB962C8B-B14F-4D97-AF65-F5344CB8AC3E}">
+        <p14:creationId xmlns:p14="http://schemas.microsoft.com/office/powerpoint/2010/main" val="186478515"/>
+      </p:ext>
+    </p:extLst>
+  </p:cSld>
+  <p:clrMapOvr>
+    <a:masterClrMapping/>
+  </p:clrMapOvr>
+</p:sld>
+</file>
+
+<file path=ppt/slides/slide18.xml><?xml version="1.0" encoding="utf-8"?>
+<p:sld xmlns:a="http://schemas.openxmlformats.org/drawingml/2006/main" xmlns:r="http://schemas.openxmlformats.org/officeDocument/2006/relationships" xmlns:p="http://schemas.openxmlformats.org/presentationml/2006/main">
+  <p:cSld>
+    <p:spTree>
+      <p:nvGrpSpPr>
+        <p:cNvPr id="1" name=""/>
+        <p:cNvGrpSpPr/>
+        <p:nvPr/>
+      </p:nvGrpSpPr>
+      <p:grpSpPr>
+        <a:xfrm>
+          <a:off x="0" y="0"/>
+          <a:ext cx="0" cy="0"/>
+          <a:chOff x="0" y="0"/>
+          <a:chExt cx="0" cy="0"/>
+        </a:xfrm>
+      </p:grpSpPr>
+      <p:sp>
+        <p:nvSpPr>
+          <p:cNvPr id="2" name="标题 1">
+            <a:extLst>
+              <a:ext uri="{FF2B5EF4-FFF2-40B4-BE49-F238E27FC236}">
+                <a16:creationId xmlns:a16="http://schemas.microsoft.com/office/drawing/2014/main" id="{8646D9FB-3ACD-384F-A4D2-D56383569BFB}"/>
+              </a:ext>
+            </a:extLst>
+          </p:cNvPr>
+          <p:cNvSpPr>
+            <a:spLocks noGrp="1"/>
+          </p:cNvSpPr>
+          <p:nvPr>
+            <p:ph type="title"/>
+          </p:nvPr>
+        </p:nvSpPr>
+        <p:spPr/>
+        <p:txBody>
+          <a:bodyPr/>
+          <a:lstStyle/>
+          <a:p>
+            <a:r>
+              <a:rPr lang="en" altLang="zh-CN" dirty="0"/>
+              <a:t>Adding your own localized messages</a:t>
+            </a:r>
+          </a:p>
+        </p:txBody>
+      </p:sp>
+      <p:sp>
+        <p:nvSpPr>
+          <p:cNvPr id="3" name="文本占位符 2">
+            <a:extLst>
+              <a:ext uri="{FF2B5EF4-FFF2-40B4-BE49-F238E27FC236}">
+                <a16:creationId xmlns:a16="http://schemas.microsoft.com/office/drawing/2014/main" id="{58940195-9C28-1940-9836-A93C75DDE7F6}"/>
+              </a:ext>
+            </a:extLst>
+          </p:cNvPr>
+          <p:cNvSpPr>
+            <a:spLocks noGrp="1"/>
+          </p:cNvSpPr>
+          <p:nvPr>
+            <p:ph type="body" idx="1"/>
+          </p:nvPr>
+        </p:nvSpPr>
+        <p:spPr/>
+        <p:txBody>
+          <a:bodyPr/>
+          <a:lstStyle/>
+          <a:p>
+            <a:r>
+              <a:rPr lang="en" altLang="zh-CN" dirty="0"/>
+              <a:t>Once the </a:t>
+            </a:r>
+            <a:r>
+              <a:rPr lang="en" altLang="zh-CN" dirty="0" err="1">
+                <a:solidFill>
+                  <a:srgbClr val="FF0000"/>
+                </a:solidFill>
+              </a:rPr>
+              <a:t>flutter_localizations</a:t>
+            </a:r>
+            <a:r>
+              <a:rPr lang="en" altLang="zh-CN" dirty="0">
+                <a:solidFill>
+                  <a:srgbClr val="FF0000"/>
+                </a:solidFill>
+              </a:rPr>
+              <a:t> </a:t>
+            </a:r>
+            <a:r>
+              <a:rPr lang="en" altLang="zh-CN" dirty="0"/>
+              <a:t>package is added, use the following instructions to add localized text to your application.</a:t>
+            </a:r>
+          </a:p>
+        </p:txBody>
+      </p:sp>
+      <p:pic>
+        <p:nvPicPr>
+          <p:cNvPr id="4" name="图片 3">
+            <a:extLst>
+              <a:ext uri="{FF2B5EF4-FFF2-40B4-BE49-F238E27FC236}">
+                <a16:creationId xmlns:a16="http://schemas.microsoft.com/office/drawing/2014/main" id="{D5817905-B75F-91F2-AE78-9277CEA7A2C0}"/>
+              </a:ext>
+            </a:extLst>
+          </p:cNvPr>
+          <p:cNvPicPr>
+            <a:picLocks noChangeAspect="1"/>
+          </p:cNvPicPr>
+          <p:nvPr/>
+        </p:nvPicPr>
+        <p:blipFill>
+          <a:blip r:embed="rId2"/>
+          <a:stretch>
+            <a:fillRect/>
+          </a:stretch>
+        </p:blipFill>
+        <p:spPr>
+          <a:xfrm>
+            <a:off x="1024758" y="2059843"/>
+            <a:ext cx="6613634" cy="2807350"/>
+          </a:xfrm>
+          <a:prstGeom prst="rect">
+            <a:avLst/>
+          </a:prstGeom>
+        </p:spPr>
+      </p:pic>
+    </p:spTree>
+    <p:extLst>
+      <p:ext uri="{BB962C8B-B14F-4D97-AF65-F5344CB8AC3E}">
+        <p14:creationId xmlns:p14="http://schemas.microsoft.com/office/powerpoint/2010/main" val="1108534154"/>
+      </p:ext>
+    </p:extLst>
+  </p:cSld>
+  <p:clrMapOvr>
+    <a:masterClrMapping/>
+  </p:clrMapOvr>
+</p:sld>
+</file>
+
+<file path=ppt/slides/slide19.xml><?xml version="1.0" encoding="utf-8"?>
+<p:sld xmlns:a="http://schemas.openxmlformats.org/drawingml/2006/main" xmlns:r="http://schemas.openxmlformats.org/officeDocument/2006/relationships" xmlns:p="http://schemas.openxmlformats.org/presentationml/2006/main">
+  <p:cSld>
+    <p:spTree>
+      <p:nvGrpSpPr>
+        <p:cNvPr id="1" name=""/>
+        <p:cNvGrpSpPr/>
+        <p:nvPr/>
+      </p:nvGrpSpPr>
+      <p:grpSpPr>
+        <a:xfrm>
+          <a:off x="0" y="0"/>
+          <a:ext cx="0" cy="0"/>
+          <a:chOff x="0" y="0"/>
+          <a:chExt cx="0" cy="0"/>
+        </a:xfrm>
+      </p:grpSpPr>
+      <p:sp>
+        <p:nvSpPr>
+          <p:cNvPr id="2" name="标题 1">
+            <a:extLst>
+              <a:ext uri="{FF2B5EF4-FFF2-40B4-BE49-F238E27FC236}">
+                <a16:creationId xmlns:a16="http://schemas.microsoft.com/office/drawing/2014/main" id="{8646D9FB-3ACD-384F-A4D2-D56383569BFB}"/>
+              </a:ext>
+            </a:extLst>
+          </p:cNvPr>
+          <p:cNvSpPr>
+            <a:spLocks noGrp="1"/>
+          </p:cNvSpPr>
+          <p:nvPr>
+            <p:ph type="title"/>
+          </p:nvPr>
+        </p:nvSpPr>
+        <p:spPr/>
+        <p:txBody>
+          <a:bodyPr/>
+          <a:lstStyle/>
+          <a:p>
+            <a:r>
+              <a:rPr lang="en" altLang="zh-CN" dirty="0"/>
+              <a:t>Adding your own localized messages</a:t>
+            </a:r>
+          </a:p>
+        </p:txBody>
+      </p:sp>
+      <p:sp>
+        <p:nvSpPr>
+          <p:cNvPr id="3" name="文本占位符 2">
+            <a:extLst>
+              <a:ext uri="{FF2B5EF4-FFF2-40B4-BE49-F238E27FC236}">
+                <a16:creationId xmlns:a16="http://schemas.microsoft.com/office/drawing/2014/main" id="{58940195-9C28-1940-9836-A93C75DDE7F6}"/>
+              </a:ext>
+            </a:extLst>
+          </p:cNvPr>
+          <p:cNvSpPr>
+            <a:spLocks noGrp="1"/>
+          </p:cNvSpPr>
+          <p:nvPr>
+            <p:ph type="body" idx="1"/>
+          </p:nvPr>
+        </p:nvSpPr>
+        <p:spPr/>
+        <p:txBody>
+          <a:bodyPr/>
+          <a:lstStyle/>
+          <a:p>
+            <a:pPr marL="114300" indent="0">
+              <a:buNone/>
+            </a:pPr>
+            <a:endParaRPr lang="en" altLang="zh-CN" dirty="0"/>
+          </a:p>
+        </p:txBody>
+      </p:sp>
+      <p:pic>
+        <p:nvPicPr>
+          <p:cNvPr id="5" name="图片 4">
+            <a:extLst>
+              <a:ext uri="{FF2B5EF4-FFF2-40B4-BE49-F238E27FC236}">
+                <a16:creationId xmlns:a16="http://schemas.microsoft.com/office/drawing/2014/main" id="{8C4283BD-3F74-4183-1312-9A00B8A61A35}"/>
+              </a:ext>
+            </a:extLst>
+          </p:cNvPr>
+          <p:cNvPicPr>
+            <a:picLocks noChangeAspect="1"/>
+          </p:cNvPicPr>
+          <p:nvPr/>
+        </p:nvPicPr>
+        <p:blipFill>
+          <a:blip r:embed="rId2"/>
+          <a:stretch>
+            <a:fillRect/>
+          </a:stretch>
+        </p:blipFill>
+        <p:spPr>
+          <a:xfrm>
+            <a:off x="1001371" y="1229875"/>
+            <a:ext cx="6518781" cy="3881170"/>
+          </a:xfrm>
+          <a:prstGeom prst="rect">
+            <a:avLst/>
+          </a:prstGeom>
+        </p:spPr>
+      </p:pic>
+    </p:spTree>
+    <p:extLst>
+      <p:ext uri="{BB962C8B-B14F-4D97-AF65-F5344CB8AC3E}">
+        <p14:creationId xmlns:p14="http://schemas.microsoft.com/office/powerpoint/2010/main" val="3734083043"/>
+      </p:ext>
+    </p:extLst>
+  </p:cSld>
+  <p:clrMapOvr>
+    <a:masterClrMapping/>
+  </p:clrMapOvr>
+</p:sld>
+</file>
+
+<file path=ppt/slides/slide2.xml><?xml version="1.0" encoding="utf-8"?>
+<p:sld xmlns:a="http://schemas.openxmlformats.org/drawingml/2006/main" xmlns:r="http://schemas.openxmlformats.org/officeDocument/2006/relationships" xmlns:p="http://schemas.openxmlformats.org/presentationml/2006/main">
+  <p:cSld>
+    <p:spTree>
+      <p:nvGrpSpPr>
+        <p:cNvPr id="1" name="Shape 91"/>
+        <p:cNvGrpSpPr/>
+        <p:nvPr/>
+      </p:nvGrpSpPr>
+      <p:grpSpPr>
+        <a:xfrm>
+          <a:off x="0" y="0"/>
+          <a:ext cx="0" cy="0"/>
+          <a:chOff x="0" y="0"/>
+          <a:chExt cx="0" cy="0"/>
+        </a:xfrm>
+      </p:grpSpPr>
+      <p:sp>
+        <p:nvSpPr>
+          <p:cNvPr id="4" name="标题 3">
+            <a:extLst>
+              <a:ext uri="{FF2B5EF4-FFF2-40B4-BE49-F238E27FC236}">
+                <a16:creationId xmlns:a16="http://schemas.microsoft.com/office/drawing/2014/main" id="{8E7D5A00-A81D-B849-936B-AA716AEC7015}"/>
+              </a:ext>
+            </a:extLst>
+          </p:cNvPr>
+          <p:cNvSpPr>
+            <a:spLocks noGrp="1"/>
+          </p:cNvSpPr>
+          <p:nvPr>
+            <p:ph type="title"/>
+          </p:nvPr>
+        </p:nvSpPr>
+        <p:spPr/>
+        <p:txBody>
+          <a:bodyPr/>
+          <a:lstStyle/>
+          <a:p>
+            <a:r>
+              <a:rPr lang="en-US" altLang="zh-CN" dirty="0"/>
+              <a:t>Topics</a:t>
+            </a:r>
+            <a:endParaRPr lang="zh-CN" altLang="en-US" dirty="0"/>
+          </a:p>
+        </p:txBody>
+      </p:sp>
+      <p:sp>
+        <p:nvSpPr>
+          <p:cNvPr id="7" name="文本占位符 6">
+            <a:extLst>
+              <a:ext uri="{FF2B5EF4-FFF2-40B4-BE49-F238E27FC236}">
+                <a16:creationId xmlns:a16="http://schemas.microsoft.com/office/drawing/2014/main" id="{C9550E76-3CDF-7445-9554-23270A19B3DF}"/>
+              </a:ext>
+            </a:extLst>
+          </p:cNvPr>
+          <p:cNvSpPr>
+            <a:spLocks noGrp="1"/>
+          </p:cNvSpPr>
+          <p:nvPr>
+            <p:ph type="body" idx="1"/>
+          </p:nvPr>
+        </p:nvSpPr>
+        <p:spPr/>
+        <p:txBody>
+          <a:bodyPr/>
+          <a:lstStyle/>
+          <a:p>
+            <a:r>
+              <a:rPr lang="en" altLang="zh-CN" sz="2400" dirty="0">
+                <a:hlinkClick r:id="rId3"/>
+              </a:rPr>
+              <a:t>Accessibility</a:t>
+            </a:r>
+            <a:endParaRPr lang="en" altLang="zh-CN" sz="2400" dirty="0"/>
+          </a:p>
+          <a:p>
+            <a:r>
+              <a:rPr lang="en" altLang="zh-CN" sz="2400" dirty="0">
+                <a:hlinkClick r:id="rId4"/>
+              </a:rPr>
+              <a:t>Internationalization</a:t>
+            </a:r>
+            <a:endParaRPr lang="en" altLang="zh-CN" sz="2400" dirty="0"/>
+          </a:p>
+          <a:p>
+            <a:endParaRPr lang="zh-CN" altLang="en-US" dirty="0"/>
+          </a:p>
+        </p:txBody>
+      </p:sp>
+    </p:spTree>
+  </p:cSld>
+  <p:clrMapOvr>
+    <a:masterClrMapping/>
+  </p:clrMapOvr>
+</p:sld>
+</file>
+
+<file path=ppt/slides/slide20.xml><?xml version="1.0" encoding="utf-8"?>
+<p:sld xmlns:a="http://schemas.openxmlformats.org/drawingml/2006/main" xmlns:r="http://schemas.openxmlformats.org/officeDocument/2006/relationships" xmlns:p="http://schemas.openxmlformats.org/presentationml/2006/main">
+  <p:cSld>
+    <p:spTree>
+      <p:nvGrpSpPr>
+        <p:cNvPr id="1" name=""/>
+        <p:cNvGrpSpPr/>
+        <p:nvPr/>
+      </p:nvGrpSpPr>
+      <p:grpSpPr>
+        <a:xfrm>
+          <a:off x="0" y="0"/>
+          <a:ext cx="0" cy="0"/>
+          <a:chOff x="0" y="0"/>
+          <a:chExt cx="0" cy="0"/>
+        </a:xfrm>
+      </p:grpSpPr>
+      <p:sp>
+        <p:nvSpPr>
+          <p:cNvPr id="2" name="标题 1">
+            <a:extLst>
+              <a:ext uri="{FF2B5EF4-FFF2-40B4-BE49-F238E27FC236}">
+                <a16:creationId xmlns:a16="http://schemas.microsoft.com/office/drawing/2014/main" id="{8646D9FB-3ACD-384F-A4D2-D56383569BFB}"/>
+              </a:ext>
+            </a:extLst>
+          </p:cNvPr>
+          <p:cNvSpPr>
+            <a:spLocks noGrp="1"/>
+          </p:cNvSpPr>
+          <p:nvPr>
+            <p:ph type="title"/>
+          </p:nvPr>
+        </p:nvSpPr>
+        <p:spPr/>
+        <p:txBody>
+          <a:bodyPr/>
+          <a:lstStyle/>
+          <a:p>
+            <a:r>
+              <a:rPr lang="en" altLang="zh-CN" dirty="0"/>
+              <a:t>Adding your own localized messages</a:t>
+            </a:r>
+          </a:p>
+        </p:txBody>
+      </p:sp>
+      <p:sp>
+        <p:nvSpPr>
+          <p:cNvPr id="3" name="文本占位符 2">
+            <a:extLst>
+              <a:ext uri="{FF2B5EF4-FFF2-40B4-BE49-F238E27FC236}">
+                <a16:creationId xmlns:a16="http://schemas.microsoft.com/office/drawing/2014/main" id="{58940195-9C28-1940-9836-A93C75DDE7F6}"/>
+              </a:ext>
+            </a:extLst>
+          </p:cNvPr>
+          <p:cNvSpPr>
+            <a:spLocks noGrp="1"/>
+          </p:cNvSpPr>
+          <p:nvPr>
+            <p:ph type="body" idx="1"/>
+          </p:nvPr>
+        </p:nvSpPr>
+        <p:spPr/>
+        <p:txBody>
+          <a:bodyPr/>
+          <a:lstStyle/>
+          <a:p>
+            <a:pPr marL="114300" indent="0">
+              <a:buNone/>
+            </a:pPr>
+            <a:endParaRPr lang="en" altLang="zh-CN" dirty="0"/>
+          </a:p>
+        </p:txBody>
+      </p:sp>
+      <p:pic>
+        <p:nvPicPr>
+          <p:cNvPr id="4" name="图片 3">
+            <a:extLst>
+              <a:ext uri="{FF2B5EF4-FFF2-40B4-BE49-F238E27FC236}">
+                <a16:creationId xmlns:a16="http://schemas.microsoft.com/office/drawing/2014/main" id="{0A317A37-A045-F4A0-F4C5-DDBCB3F9BCC1}"/>
+              </a:ext>
+            </a:extLst>
+          </p:cNvPr>
+          <p:cNvPicPr>
+            <a:picLocks noChangeAspect="1"/>
+          </p:cNvPicPr>
+          <p:nvPr/>
+        </p:nvPicPr>
+        <p:blipFill>
+          <a:blip r:embed="rId2"/>
+          <a:stretch>
+            <a:fillRect/>
+          </a:stretch>
+        </p:blipFill>
+        <p:spPr>
+          <a:xfrm>
+            <a:off x="1012321" y="1229875"/>
+            <a:ext cx="5719555" cy="3899062"/>
+          </a:xfrm>
+          <a:prstGeom prst="rect">
+            <a:avLst/>
+          </a:prstGeom>
+        </p:spPr>
+      </p:pic>
+    </p:spTree>
+    <p:extLst>
+      <p:ext uri="{BB962C8B-B14F-4D97-AF65-F5344CB8AC3E}">
+        <p14:creationId xmlns:p14="http://schemas.microsoft.com/office/powerpoint/2010/main" val="4252375278"/>
+      </p:ext>
+    </p:extLst>
+  </p:cSld>
+  <p:clrMapOvr>
+    <a:masterClrMapping/>
+  </p:clrMapOvr>
+</p:sld>
+</file>
+
+<file path=ppt/slides/slide21.xml><?xml version="1.0" encoding="utf-8"?>
+<p:sld xmlns:a="http://schemas.openxmlformats.org/drawingml/2006/main" xmlns:r="http://schemas.openxmlformats.org/officeDocument/2006/relationships" xmlns:p="http://schemas.openxmlformats.org/presentationml/2006/main">
+  <p:cSld>
+    <p:spTree>
+      <p:nvGrpSpPr>
+        <p:cNvPr id="1" name=""/>
+        <p:cNvGrpSpPr/>
+        <p:nvPr/>
+      </p:nvGrpSpPr>
+      <p:grpSpPr>
+        <a:xfrm>
+          <a:off x="0" y="0"/>
+          <a:ext cx="0" cy="0"/>
+          <a:chOff x="0" y="0"/>
+          <a:chExt cx="0" cy="0"/>
+        </a:xfrm>
+      </p:grpSpPr>
+      <p:sp>
+        <p:nvSpPr>
+          <p:cNvPr id="2" name="标题 1">
+            <a:extLst>
+              <a:ext uri="{FF2B5EF4-FFF2-40B4-BE49-F238E27FC236}">
+                <a16:creationId xmlns:a16="http://schemas.microsoft.com/office/drawing/2014/main" id="{8646D9FB-3ACD-384F-A4D2-D56383569BFB}"/>
+              </a:ext>
+            </a:extLst>
+          </p:cNvPr>
+          <p:cNvSpPr>
+            <a:spLocks noGrp="1"/>
+          </p:cNvSpPr>
+          <p:nvPr>
+            <p:ph type="title"/>
+          </p:nvPr>
+        </p:nvSpPr>
+        <p:spPr/>
+        <p:txBody>
+          <a:bodyPr/>
+          <a:lstStyle/>
+          <a:p>
+            <a:r>
+              <a:rPr lang="en" altLang="zh-CN" dirty="0"/>
+              <a:t>Adding your own localized messages</a:t>
+            </a:r>
+          </a:p>
+        </p:txBody>
+      </p:sp>
+      <p:sp>
+        <p:nvSpPr>
+          <p:cNvPr id="3" name="文本占位符 2">
+            <a:extLst>
+              <a:ext uri="{FF2B5EF4-FFF2-40B4-BE49-F238E27FC236}">
+                <a16:creationId xmlns:a16="http://schemas.microsoft.com/office/drawing/2014/main" id="{58940195-9C28-1940-9836-A93C75DDE7F6}"/>
+              </a:ext>
+            </a:extLst>
+          </p:cNvPr>
+          <p:cNvSpPr>
+            <a:spLocks noGrp="1"/>
+          </p:cNvSpPr>
+          <p:nvPr>
+            <p:ph type="body" idx="1"/>
+          </p:nvPr>
+        </p:nvSpPr>
+        <p:spPr/>
+        <p:txBody>
+          <a:bodyPr/>
+          <a:lstStyle/>
+          <a:p>
+            <a:pPr marL="114300" indent="0">
+              <a:buNone/>
+            </a:pPr>
+            <a:endParaRPr lang="en" altLang="zh-CN" dirty="0"/>
+          </a:p>
+        </p:txBody>
+      </p:sp>
+      <p:pic>
+        <p:nvPicPr>
+          <p:cNvPr id="5" name="图片 4">
+            <a:extLst>
+              <a:ext uri="{FF2B5EF4-FFF2-40B4-BE49-F238E27FC236}">
+                <a16:creationId xmlns:a16="http://schemas.microsoft.com/office/drawing/2014/main" id="{29898B44-261F-8AF6-E122-DCF0DF38A5CD}"/>
+              </a:ext>
+            </a:extLst>
+          </p:cNvPr>
+          <p:cNvPicPr>
+            <a:picLocks noChangeAspect="1"/>
+          </p:cNvPicPr>
+          <p:nvPr/>
+        </p:nvPicPr>
+        <p:blipFill>
+          <a:blip r:embed="rId2"/>
+          <a:stretch>
+            <a:fillRect/>
+          </a:stretch>
+        </p:blipFill>
+        <p:spPr>
+          <a:xfrm>
+            <a:off x="0" y="1554343"/>
+            <a:ext cx="9144000" cy="2690063"/>
+          </a:xfrm>
+          <a:prstGeom prst="rect">
+            <a:avLst/>
+          </a:prstGeom>
+        </p:spPr>
+      </p:pic>
+    </p:spTree>
+    <p:extLst>
+      <p:ext uri="{BB962C8B-B14F-4D97-AF65-F5344CB8AC3E}">
+        <p14:creationId xmlns:p14="http://schemas.microsoft.com/office/powerpoint/2010/main" val="3270105826"/>
+      </p:ext>
+    </p:extLst>
+  </p:cSld>
+  <p:clrMapOvr>
+    <a:masterClrMapping/>
+  </p:clrMapOvr>
+</p:sld>
+</file>
+
+<file path=ppt/slides/slide22.xml><?xml version="1.0" encoding="utf-8"?>
 <p:sld xmlns:a="http://schemas.openxmlformats.org/drawingml/2006/main" xmlns:r="http://schemas.openxmlformats.org/officeDocument/2006/relationships" xmlns:p="http://schemas.openxmlformats.org/presentationml/2006/main">
   <p:cSld>
     <p:spTree>
@@ -6602,6 +7860,12 @@
         <p:txBody>
           <a:bodyPr/>
           <a:lstStyle/>
+          <a:p>
+            <a:r>
+              <a:rPr lang="en" altLang="zh-CN" dirty="0"/>
+              <a:t>Some languages with multiple variants require more than just a language code to properly differentiate.</a:t>
+            </a:r>
+          </a:p>
           <a:p>
             <a:r>
               <a:rPr lang="en" altLang="zh-CN" dirty="0"/>
@@ -6654,7 +7918,7 @@
 </p:sld>
 </file>
 
-<file path=ppt/slides/slide15.xml><?xml version="1.0" encoding="utf-8"?>
+<file path=ppt/slides/slide23.xml><?xml version="1.0" encoding="utf-8"?>
 <p:sld xmlns:a="http://schemas.openxmlformats.org/drawingml/2006/main" xmlns:r="http://schemas.openxmlformats.org/officeDocument/2006/relationships" xmlns:p="http://schemas.openxmlformats.org/presentationml/2006/main">
   <p:cSld>
     <p:spTree>
@@ -6676,7 +7940,7 @@
           <p:cNvPr id="2" name="标题 1">
             <a:extLst>
               <a:ext uri="{FF2B5EF4-FFF2-40B4-BE49-F238E27FC236}">
-                <a16:creationId xmlns:a16="http://schemas.microsoft.com/office/drawing/2014/main" id="{D8537B5B-AD78-6346-A196-CE3F14AF1800}"/>
+                <a16:creationId xmlns:a16="http://schemas.microsoft.com/office/drawing/2014/main" id="{8646D9FB-3ACD-384F-A4D2-D56383569BFB}"/>
               </a:ext>
             </a:extLst>
           </p:cNvPr>
@@ -6694,7 +7958,7 @@
           <a:p>
             <a:r>
               <a:rPr lang="en" altLang="zh-CN" dirty="0"/>
-              <a:t>Alternative internationalization workflows</a:t>
+              <a:t>Tracking the locale</a:t>
             </a:r>
           </a:p>
         </p:txBody>
@@ -6704,7 +7968,7 @@
           <p:cNvPr id="3" name="文本占位符 2">
             <a:extLst>
               <a:ext uri="{FF2B5EF4-FFF2-40B4-BE49-F238E27FC236}">
-                <a16:creationId xmlns:a16="http://schemas.microsoft.com/office/drawing/2014/main" id="{49B79105-B11D-4C49-96EE-256AE5891F48}"/>
+                <a16:creationId xmlns:a16="http://schemas.microsoft.com/office/drawing/2014/main" id="{58940195-9C28-1940-9836-A93C75DDE7F6}"/>
               </a:ext>
             </a:extLst>
           </p:cNvPr>
@@ -6715,57 +7979,64 @@
             <p:ph type="body" idx="1"/>
           </p:nvPr>
         </p:nvSpPr>
-        <p:spPr>
-          <a:xfrm>
-            <a:off x="311700" y="1229875"/>
-            <a:ext cx="3345900" cy="3339000"/>
-          </a:xfrm>
-        </p:spPr>
+        <p:spPr/>
         <p:txBody>
           <a:bodyPr/>
           <a:lstStyle/>
           <a:p>
             <a:r>
               <a:rPr lang="en" altLang="zh-CN" dirty="0"/>
-              <a:t>An alternative class for the app’s localized resources</a:t>
+              <a:t>The </a:t>
+            </a:r>
+            <a:r>
+              <a:rPr lang="en" altLang="zh-CN" dirty="0">
+                <a:hlinkClick r:id="rId2"/>
+              </a:rPr>
+              <a:t>Locale</a:t>
+            </a:r>
+            <a:r>
+              <a:rPr lang="en" altLang="zh-CN" dirty="0"/>
+              <a:t> class identifies the user’s language. </a:t>
+            </a:r>
+          </a:p>
+          <a:p>
+            <a:r>
+              <a:rPr lang="en" altLang="zh-CN" dirty="0"/>
+              <a:t>The </a:t>
+            </a:r>
+            <a:r>
+              <a:rPr lang="en" altLang="zh-CN" dirty="0">
+                <a:hlinkClick r:id="rId3"/>
+              </a:rPr>
+              <a:t>Localizations</a:t>
+            </a:r>
+            <a:r>
+              <a:rPr lang="en" altLang="zh-CN" dirty="0"/>
+              <a:t> widget defines the locale for its child and the localized resources that the child depends on.</a:t>
+            </a:r>
+          </a:p>
+          <a:p>
+            <a:r>
+              <a:rPr lang="en" altLang="zh-CN" dirty="0"/>
+              <a:t>The </a:t>
+            </a:r>
+            <a:r>
+              <a:rPr lang="en" altLang="zh-CN" dirty="0">
+                <a:hlinkClick r:id="rId4"/>
+              </a:rPr>
+              <a:t>WidgetsApp</a:t>
+            </a:r>
+            <a:r>
+              <a:rPr lang="en" altLang="zh-CN" dirty="0"/>
+              <a:t> widget creates a Localizations widget and rebuilds it if the system’s locale changes.</a:t>
             </a:r>
           </a:p>
         </p:txBody>
       </p:sp>
-      <p:pic>
-        <p:nvPicPr>
-          <p:cNvPr id="5" name="图片 4">
-            <a:extLst>
-              <a:ext uri="{FF2B5EF4-FFF2-40B4-BE49-F238E27FC236}">
-                <a16:creationId xmlns:a16="http://schemas.microsoft.com/office/drawing/2014/main" id="{6E7BC7BD-0731-124F-9EF4-E9F673364A23}"/>
-              </a:ext>
-            </a:extLst>
-          </p:cNvPr>
-          <p:cNvPicPr>
-            <a:picLocks noChangeAspect="1"/>
-          </p:cNvPicPr>
-          <p:nvPr/>
-        </p:nvPicPr>
-        <p:blipFill>
-          <a:blip r:embed="rId2"/>
-          <a:stretch>
-            <a:fillRect/>
-          </a:stretch>
-        </p:blipFill>
-        <p:spPr>
-          <a:xfrm>
-            <a:off x="3657600" y="1120147"/>
-            <a:ext cx="4924195" cy="3771900"/>
-          </a:xfrm>
-          <a:prstGeom prst="rect">
-            <a:avLst/>
-          </a:prstGeom>
-        </p:spPr>
-      </p:pic>
     </p:spTree>
     <p:extLst>
       <p:ext uri="{BB962C8B-B14F-4D97-AF65-F5344CB8AC3E}">
-        <p14:creationId xmlns:p14="http://schemas.microsoft.com/office/powerpoint/2010/main" val="1950242128"/>
+        <p14:creationId xmlns:p14="http://schemas.microsoft.com/office/powerpoint/2010/main" val="1003018210"/>
       </p:ext>
     </p:extLst>
   </p:cSld>
@@ -6775,7 +8046,7 @@
 </p:sld>
 </file>
 
-<file path=ppt/slides/slide16.xml><?xml version="1.0" encoding="utf-8"?>
+<file path=ppt/slides/slide24.xml><?xml version="1.0" encoding="utf-8"?>
 <p:sld xmlns:a="http://schemas.openxmlformats.org/drawingml/2006/main" xmlns:r="http://schemas.openxmlformats.org/officeDocument/2006/relationships" xmlns:p="http://schemas.openxmlformats.org/presentationml/2006/main">
   <p:cSld>
     <p:spTree>
@@ -6914,103 +8185,6 @@
               <a:buNone/>
             </a:pPr>
             <a:endParaRPr dirty="0"/>
-          </a:p>
-        </p:txBody>
-      </p:sp>
-    </p:spTree>
-  </p:cSld>
-  <p:clrMapOvr>
-    <a:masterClrMapping/>
-  </p:clrMapOvr>
-</p:sld>
-</file>
-
-<file path=ppt/slides/slide2.xml><?xml version="1.0" encoding="utf-8"?>
-<p:sld xmlns:a="http://schemas.openxmlformats.org/drawingml/2006/main" xmlns:r="http://schemas.openxmlformats.org/officeDocument/2006/relationships" xmlns:p="http://schemas.openxmlformats.org/presentationml/2006/main">
-  <p:cSld>
-    <p:spTree>
-      <p:nvGrpSpPr>
-        <p:cNvPr id="1" name="Shape 91"/>
-        <p:cNvGrpSpPr/>
-        <p:nvPr/>
-      </p:nvGrpSpPr>
-      <p:grpSpPr>
-        <a:xfrm>
-          <a:off x="0" y="0"/>
-          <a:ext cx="0" cy="0"/>
-          <a:chOff x="0" y="0"/>
-          <a:chExt cx="0" cy="0"/>
-        </a:xfrm>
-      </p:grpSpPr>
-      <p:sp>
-        <p:nvSpPr>
-          <p:cNvPr id="4" name="标题 3">
-            <a:extLst>
-              <a:ext uri="{FF2B5EF4-FFF2-40B4-BE49-F238E27FC236}">
-                <a16:creationId xmlns:a16="http://schemas.microsoft.com/office/drawing/2014/main" id="{8E7D5A00-A81D-B849-936B-AA716AEC7015}"/>
-              </a:ext>
-            </a:extLst>
-          </p:cNvPr>
-          <p:cNvSpPr>
-            <a:spLocks noGrp="1"/>
-          </p:cNvSpPr>
-          <p:nvPr>
-            <p:ph type="title"/>
-          </p:nvPr>
-        </p:nvSpPr>
-        <p:spPr/>
-        <p:txBody>
-          <a:bodyPr/>
-          <a:lstStyle/>
-          <a:p>
-            <a:r>
-              <a:rPr lang="en-US" altLang="zh-CN" dirty="0"/>
-              <a:t>Topics</a:t>
-            </a:r>
-            <a:endParaRPr lang="zh-CN" altLang="en-US" dirty="0"/>
-          </a:p>
-        </p:txBody>
-      </p:sp>
-      <p:sp>
-        <p:nvSpPr>
-          <p:cNvPr id="7" name="文本占位符 6">
-            <a:extLst>
-              <a:ext uri="{FF2B5EF4-FFF2-40B4-BE49-F238E27FC236}">
-                <a16:creationId xmlns:a16="http://schemas.microsoft.com/office/drawing/2014/main" id="{C9550E76-3CDF-7445-9554-23270A19B3DF}"/>
-              </a:ext>
-            </a:extLst>
-          </p:cNvPr>
-          <p:cNvSpPr>
-            <a:spLocks noGrp="1"/>
-          </p:cNvSpPr>
-          <p:nvPr>
-            <p:ph type="body" idx="1"/>
-          </p:nvPr>
-        </p:nvSpPr>
-        <p:spPr/>
-        <p:txBody>
-          <a:bodyPr/>
-          <a:lstStyle/>
-          <a:p>
-            <a:r>
-              <a:rPr lang="en" altLang="zh-CN" sz="2400" dirty="0">
-                <a:hlinkClick r:id="rId3"/>
-              </a:rPr>
-              <a:t>Accessibility</a:t>
-            </a:r>
-            <a:endParaRPr lang="en" altLang="zh-CN" sz="2400" dirty="0"/>
-          </a:p>
-          <a:p>
-            <a:r>
-              <a:rPr lang="en" altLang="zh-CN" sz="2400" dirty="0">
-                <a:hlinkClick r:id="rId4"/>
-              </a:rPr>
-              <a:t>Internationalization</a:t>
-            </a:r>
-            <a:endParaRPr lang="en" altLang="zh-CN" sz="2400" dirty="0"/>
-          </a:p>
-          <a:p>
-            <a:endParaRPr lang="zh-CN" altLang="en-US" dirty="0"/>
           </a:p>
         </p:txBody>
       </p:sp>
@@ -7736,7 +8910,7 @@
   <p:cSld>
     <p:spTree>
       <p:nvGrpSpPr>
-        <p:cNvPr id="1" name=""/>
+        <p:cNvPr id="1" name="Shape 91"/>
         <p:cNvGrpSpPr/>
         <p:nvPr/>
       </p:nvGrpSpPr>
@@ -7750,28 +8924,32 @@
       </p:grpSpPr>
       <p:sp>
         <p:nvSpPr>
-          <p:cNvPr id="2" name="标题 1">
-            <a:extLst>
-              <a:ext uri="{FF2B5EF4-FFF2-40B4-BE49-F238E27FC236}">
-                <a16:creationId xmlns:a16="http://schemas.microsoft.com/office/drawing/2014/main" id="{8C11FDA8-AF18-FA43-9504-DFDBB3A97747}"/>
-              </a:ext>
-            </a:extLst>
-          </p:cNvPr>
-          <p:cNvSpPr>
+          <p:cNvPr id="92" name="Google Shape;92;p14"/>
+          <p:cNvSpPr txBox="1">
             <a:spLocks noGrp="1"/>
           </p:cNvSpPr>
           <p:nvPr>
             <p:ph type="title"/>
           </p:nvPr>
         </p:nvSpPr>
-        <p:spPr/>
+        <p:spPr>
+          <a:xfrm>
+            <a:off x="311700" y="410000"/>
+            <a:ext cx="8520600" cy="607800"/>
+          </a:xfrm>
+          <a:prstGeom prst="rect">
+            <a:avLst/>
+          </a:prstGeom>
+        </p:spPr>
         <p:txBody>
-          <a:bodyPr/>
+          <a:bodyPr spcFirstLastPara="1" wrap="square" lIns="91425" tIns="91425" rIns="91425" bIns="91425" anchor="t" anchorCtr="0">
+            <a:noAutofit/>
+          </a:bodyPr>
           <a:lstStyle/>
           <a:p>
             <a:r>
               <a:rPr lang="en" altLang="zh-CN" dirty="0"/>
-              <a:t>Accessibility release checklist</a:t>
+              <a:t>Building with accessibility in mind</a:t>
             </a:r>
           </a:p>
         </p:txBody>
@@ -7781,7 +8959,7 @@
           <p:cNvPr id="3" name="文本占位符 2">
             <a:extLst>
               <a:ext uri="{FF2B5EF4-FFF2-40B4-BE49-F238E27FC236}">
-                <a16:creationId xmlns:a16="http://schemas.microsoft.com/office/drawing/2014/main" id="{3135C567-0A5A-FA4A-908F-05ACAD91C297}"/>
+                <a16:creationId xmlns:a16="http://schemas.microsoft.com/office/drawing/2014/main" id="{DF95352D-43AA-AA48-93E5-7841BA12831B}"/>
               </a:ext>
             </a:extLst>
           </p:cNvPr>
@@ -7798,75 +8976,121 @@
           <a:lstStyle/>
           <a:p>
             <a:r>
-              <a:rPr lang="en" altLang="zh-CN" b="1" dirty="0"/>
-              <a:t>Active interactions</a:t>
-            </a:r>
-            <a:r>
               <a:rPr lang="en" altLang="zh-CN" dirty="0"/>
-              <a:t>. Ensure that all active interactions do something.</a:t>
-            </a:r>
-          </a:p>
-          <a:p>
-            <a:r>
-              <a:rPr lang="en" altLang="zh-CN" b="1" dirty="0"/>
-              <a:t>Screen reader testing</a:t>
-            </a:r>
+              <a:t>Ensuring your app can be used by everyone means building accessibility into it from the start. </a:t>
+            </a:r>
+          </a:p>
+          <a:p>
             <a:r>
               <a:rPr lang="en" altLang="zh-CN" dirty="0"/>
-              <a:t>. Test your app with </a:t>
-            </a:r>
-            <a:r>
-              <a:rPr lang="en" altLang="zh-CN" dirty="0">
-                <a:hlinkClick r:id="rId2"/>
-              </a:rPr>
-              <a:t>TalkBack</a:t>
-            </a:r>
-            <a:r>
-              <a:rPr lang="en" altLang="zh-CN" dirty="0"/>
-              <a:t> (Android) and </a:t>
-            </a:r>
-            <a:r>
-              <a:rPr lang="en" altLang="zh-CN" dirty="0">
-                <a:hlinkClick r:id="rId3"/>
-              </a:rPr>
-              <a:t>VoiceOver</a:t>
-            </a:r>
-            <a:r>
-              <a:rPr lang="en" altLang="zh-CN" dirty="0"/>
-              <a:t> (iOS).</a:t>
-            </a:r>
-          </a:p>
-          <a:p>
-            <a:r>
-              <a:rPr lang="en" altLang="zh-CN" b="1" dirty="0"/>
-              <a:t>Contrast ratios</a:t>
-            </a:r>
-            <a:r>
-              <a:rPr lang="en" altLang="zh-CN" dirty="0"/>
-              <a:t>. We encourage you to have a contrast ratio of at least 4.5:1 between controls or text and the background, with the exception of disabled components.</a:t>
-            </a:r>
-          </a:p>
-          <a:p>
-            <a:r>
-              <a:rPr lang="en" altLang="zh-CN" b="1" dirty="0"/>
-              <a:t>Context switching</a:t>
-            </a:r>
-            <a:r>
-              <a:rPr lang="en" altLang="zh-CN" dirty="0"/>
-              <a:t>. Nothing should change the user’s context automatically while typing in information</a:t>
-            </a:r>
-            <a:r>
-              <a:rPr lang="en-US" altLang="zh-CN" dirty="0"/>
-              <a:t>.</a:t>
-            </a:r>
-            <a:endParaRPr lang="en" altLang="zh-CN" dirty="0"/>
+              <a:t>See the video below, </a:t>
+            </a:r>
           </a:p>
         </p:txBody>
       </p:sp>
+      <p:sp>
+        <p:nvSpPr>
+          <p:cNvPr id="2" name="矩形 1">
+            <a:extLst>
+              <a:ext uri="{FF2B5EF4-FFF2-40B4-BE49-F238E27FC236}">
+                <a16:creationId xmlns:a16="http://schemas.microsoft.com/office/drawing/2014/main" id="{DC4A723F-B1D0-011D-0C9D-06C84ADD903F}"/>
+              </a:ext>
+            </a:extLst>
+          </p:cNvPr>
+          <p:cNvSpPr/>
+          <p:nvPr/>
+        </p:nvSpPr>
+        <p:spPr>
+          <a:xfrm>
+            <a:off x="5559242" y="2662254"/>
+            <a:ext cx="2743059" cy="307777"/>
+          </a:xfrm>
+          <a:prstGeom prst="rect">
+            <a:avLst/>
+          </a:prstGeom>
+        </p:spPr>
+        <p:txBody>
+          <a:bodyPr wrap="none">
+            <a:spAutoFit/>
+          </a:bodyPr>
+          <a:lstStyle/>
+          <a:p>
+            <a:r>
+              <a:rPr lang="zh-CN" altLang="en-US" dirty="0"/>
+              <a:t>https://youtu.be/bWbBgbmAdQs</a:t>
+            </a:r>
+          </a:p>
+        </p:txBody>
+      </p:sp>
+      <p:sp>
+        <p:nvSpPr>
+          <p:cNvPr id="4" name="矩形 3">
+            <a:extLst>
+              <a:ext uri="{FF2B5EF4-FFF2-40B4-BE49-F238E27FC236}">
+                <a16:creationId xmlns:a16="http://schemas.microsoft.com/office/drawing/2014/main" id="{F8E92FD6-9DF9-A00F-89A1-99E5D1F261CC}"/>
+              </a:ext>
+            </a:extLst>
+          </p:cNvPr>
+          <p:cNvSpPr/>
+          <p:nvPr/>
+        </p:nvSpPr>
+        <p:spPr>
+          <a:xfrm>
+            <a:off x="5184648" y="3182106"/>
+            <a:ext cx="3959352" cy="738664"/>
+          </a:xfrm>
+          <a:prstGeom prst="rect">
+            <a:avLst/>
+          </a:prstGeom>
+        </p:spPr>
+        <p:txBody>
+          <a:bodyPr wrap="square">
+            <a:spAutoFit/>
+          </a:bodyPr>
+          <a:lstStyle/>
+          <a:p>
+            <a:r>
+              <a:rPr lang="zh-CN" altLang="en-US" dirty="0"/>
+              <a:t>https://flutter.cn/docs/development/accessibility-and-localization/accessibility#building-with-accessibility-in-mind</a:t>
+            </a:r>
+          </a:p>
+        </p:txBody>
+      </p:sp>
+      <p:pic>
+        <p:nvPicPr>
+          <p:cNvPr id="5" name="图片 4">
+            <a:hlinkClick r:id="rId3"/>
+            <a:extLst>
+              <a:ext uri="{FF2B5EF4-FFF2-40B4-BE49-F238E27FC236}">
+                <a16:creationId xmlns:a16="http://schemas.microsoft.com/office/drawing/2014/main" id="{FC53409D-55E0-32FE-A004-3E86AAE8D57F}"/>
+              </a:ext>
+            </a:extLst>
+          </p:cNvPr>
+          <p:cNvPicPr>
+            <a:picLocks noChangeAspect="1"/>
+          </p:cNvPicPr>
+          <p:nvPr/>
+        </p:nvPicPr>
+        <p:blipFill>
+          <a:blip r:embed="rId4"/>
+          <a:stretch>
+            <a:fillRect/>
+          </a:stretch>
+        </p:blipFill>
+        <p:spPr>
+          <a:xfrm>
+            <a:off x="850865" y="2453332"/>
+            <a:ext cx="4169213" cy="2280168"/>
+          </a:xfrm>
+          <a:prstGeom prst="rect">
+            <a:avLst/>
+          </a:prstGeom>
+        </p:spPr>
+      </p:pic>
     </p:spTree>
     <p:extLst>
       <p:ext uri="{BB962C8B-B14F-4D97-AF65-F5344CB8AC3E}">
-        <p14:creationId xmlns:p14="http://schemas.microsoft.com/office/powerpoint/2010/main" val="799262490"/>
+        <p14:creationId xmlns:p14="http://schemas.microsoft.com/office/powerpoint/2010/main" val="1347478435"/>
       </p:ext>
     </p:extLst>
   </p:cSld>

</xml_diff>